<commit_message>
remove the condition for applying the convolution in the residual block
</commit_message>
<xml_diff>
--- a/models_representation.pptx
+++ b/models_representation.pptx
@@ -218,7 +218,7 @@
           <a:p>
             <a:fld id="{53A7101E-77CC-774B-8B89-8BCF5404A3E1}" type="datetimeFigureOut">
               <a:rPr lang="it-IT" smtClean="0"/>
-              <a:t>11/09/2024</a:t>
+              <a:t>17/09/24</a:t>
             </a:fld>
             <a:endParaRPr lang="it-IT"/>
           </a:p>
@@ -716,7 +716,7 @@
           <a:p>
             <a:fld id="{945283D2-C903-3141-AE1B-7D2BA63A2436}" type="datetimeFigureOut">
               <a:rPr lang="it-IT" smtClean="0"/>
-              <a:t>11/09/2024</a:t>
+              <a:t>17/09/24</a:t>
             </a:fld>
             <a:endParaRPr lang="it-IT"/>
           </a:p>
@@ -914,7 +914,7 @@
           <a:p>
             <a:fld id="{945283D2-C903-3141-AE1B-7D2BA63A2436}" type="datetimeFigureOut">
               <a:rPr lang="it-IT" smtClean="0"/>
-              <a:t>11/09/2024</a:t>
+              <a:t>17/09/24</a:t>
             </a:fld>
             <a:endParaRPr lang="it-IT"/>
           </a:p>
@@ -1122,7 +1122,7 @@
           <a:p>
             <a:fld id="{945283D2-C903-3141-AE1B-7D2BA63A2436}" type="datetimeFigureOut">
               <a:rPr lang="it-IT" smtClean="0"/>
-              <a:t>11/09/2024</a:t>
+              <a:t>17/09/24</a:t>
             </a:fld>
             <a:endParaRPr lang="it-IT"/>
           </a:p>
@@ -1320,7 +1320,7 @@
           <a:p>
             <a:fld id="{945283D2-C903-3141-AE1B-7D2BA63A2436}" type="datetimeFigureOut">
               <a:rPr lang="it-IT" smtClean="0"/>
-              <a:t>11/09/2024</a:t>
+              <a:t>17/09/24</a:t>
             </a:fld>
             <a:endParaRPr lang="it-IT"/>
           </a:p>
@@ -1595,7 +1595,7 @@
           <a:p>
             <a:fld id="{945283D2-C903-3141-AE1B-7D2BA63A2436}" type="datetimeFigureOut">
               <a:rPr lang="it-IT" smtClean="0"/>
-              <a:t>11/09/2024</a:t>
+              <a:t>17/09/24</a:t>
             </a:fld>
             <a:endParaRPr lang="it-IT"/>
           </a:p>
@@ -1860,7 +1860,7 @@
           <a:p>
             <a:fld id="{945283D2-C903-3141-AE1B-7D2BA63A2436}" type="datetimeFigureOut">
               <a:rPr lang="it-IT" smtClean="0"/>
-              <a:t>11/09/2024</a:t>
+              <a:t>17/09/24</a:t>
             </a:fld>
             <a:endParaRPr lang="it-IT"/>
           </a:p>
@@ -2272,7 +2272,7 @@
           <a:p>
             <a:fld id="{945283D2-C903-3141-AE1B-7D2BA63A2436}" type="datetimeFigureOut">
               <a:rPr lang="it-IT" smtClean="0"/>
-              <a:t>11/09/2024</a:t>
+              <a:t>17/09/24</a:t>
             </a:fld>
             <a:endParaRPr lang="it-IT"/>
           </a:p>
@@ -2413,7 +2413,7 @@
           <a:p>
             <a:fld id="{945283D2-C903-3141-AE1B-7D2BA63A2436}" type="datetimeFigureOut">
               <a:rPr lang="it-IT" smtClean="0"/>
-              <a:t>11/09/2024</a:t>
+              <a:t>17/09/24</a:t>
             </a:fld>
             <a:endParaRPr lang="it-IT"/>
           </a:p>
@@ -2526,7 +2526,7 @@
           <a:p>
             <a:fld id="{945283D2-C903-3141-AE1B-7D2BA63A2436}" type="datetimeFigureOut">
               <a:rPr lang="it-IT" smtClean="0"/>
-              <a:t>11/09/2024</a:t>
+              <a:t>17/09/24</a:t>
             </a:fld>
             <a:endParaRPr lang="it-IT"/>
           </a:p>
@@ -2837,7 +2837,7 @@
           <a:p>
             <a:fld id="{945283D2-C903-3141-AE1B-7D2BA63A2436}" type="datetimeFigureOut">
               <a:rPr lang="it-IT" smtClean="0"/>
-              <a:t>11/09/2024</a:t>
+              <a:t>17/09/24</a:t>
             </a:fld>
             <a:endParaRPr lang="it-IT"/>
           </a:p>
@@ -3125,7 +3125,7 @@
           <a:p>
             <a:fld id="{945283D2-C903-3141-AE1B-7D2BA63A2436}" type="datetimeFigureOut">
               <a:rPr lang="it-IT" smtClean="0"/>
-              <a:t>11/09/2024</a:t>
+              <a:t>17/09/24</a:t>
             </a:fld>
             <a:endParaRPr lang="it-IT"/>
           </a:p>
@@ -3366,7 +3366,7 @@
           <a:p>
             <a:fld id="{945283D2-C903-3141-AE1B-7D2BA63A2436}" type="datetimeFigureOut">
               <a:rPr lang="it-IT" smtClean="0"/>
-              <a:t>11/09/2024</a:t>
+              <a:t>17/09/24</a:t>
             </a:fld>
             <a:endParaRPr lang="it-IT"/>
           </a:p>
@@ -24652,96 +24652,6 @@
           </a:fontRef>
         </p:style>
       </p:cxnSp>
-      <p:sp>
-        <p:nvSpPr>
-          <p:cNvPr id="64" name="Rettangolo 63">
-            <a:extLst>
-              <a:ext uri="{FF2B5EF4-FFF2-40B4-BE49-F238E27FC236}">
-                <a16:creationId xmlns:a16="http://schemas.microsoft.com/office/drawing/2014/main" id="{6D6A24FD-F300-856A-E806-E6A079A50E4A}"/>
-              </a:ext>
-            </a:extLst>
-          </p:cNvPr>
-          <p:cNvSpPr/>
-          <p:nvPr/>
-        </p:nvSpPr>
-        <p:spPr>
-          <a:xfrm>
-            <a:off x="4998739" y="4200148"/>
-            <a:ext cx="659342" cy="267065"/>
-          </a:xfrm>
-          <a:prstGeom prst="rect">
-            <a:avLst/>
-          </a:prstGeom>
-        </p:spPr>
-        <p:style>
-          <a:lnRef idx="2">
-            <a:schemeClr val="accent1">
-              <a:shade val="15000"/>
-            </a:schemeClr>
-          </a:lnRef>
-          <a:fillRef idx="1">
-            <a:schemeClr val="accent1"/>
-          </a:fillRef>
-          <a:effectRef idx="0">
-            <a:schemeClr val="accent1"/>
-          </a:effectRef>
-          <a:fontRef idx="minor">
-            <a:schemeClr val="lt1"/>
-          </a:fontRef>
-        </p:style>
-        <p:txBody>
-          <a:bodyPr rtlCol="0" anchor="ctr"/>
-          <a:lstStyle/>
-          <a:p>
-            <a:pPr algn="ctr"/>
-            <a:r>
-              <a:rPr lang="it-IT" sz="900" dirty="0" err="1">
-                <a:solidFill>
-                  <a:srgbClr val="FFFF00"/>
-                </a:solidFill>
-              </a:rPr>
-              <a:t>If</a:t>
-            </a:r>
-            <a:r>
-              <a:rPr lang="it-IT" sz="900" dirty="0">
-                <a:solidFill>
-                  <a:srgbClr val="FFFF00"/>
-                </a:solidFill>
-              </a:rPr>
-              <a:t> </a:t>
-            </a:r>
-            <a:r>
-              <a:rPr lang="it-IT" sz="900" dirty="0" err="1">
-                <a:solidFill>
-                  <a:srgbClr val="FFFF00"/>
-                </a:solidFill>
-              </a:rPr>
-              <a:t>shape</a:t>
-            </a:r>
-            <a:r>
-              <a:rPr lang="it-IT" sz="900" dirty="0">
-                <a:solidFill>
-                  <a:srgbClr val="FFFF00"/>
-                </a:solidFill>
-              </a:rPr>
-              <a:t> </a:t>
-            </a:r>
-            <a:r>
-              <a:rPr lang="it-IT" sz="900" dirty="0" err="1">
-                <a:solidFill>
-                  <a:srgbClr val="FFFF00"/>
-                </a:solidFill>
-              </a:rPr>
-              <a:t>different</a:t>
-            </a:r>
-            <a:endParaRPr lang="it-IT" sz="900" dirty="0">
-              <a:solidFill>
-                <a:srgbClr val="FFFF00"/>
-              </a:solidFill>
-            </a:endParaRPr>
-          </a:p>
-        </p:txBody>
-      </p:sp>
       <p:sp>
         <p:nvSpPr>
           <p:cNvPr id="25" name="Rettangolo 24">

</xml_diff>